<commit_message>
mom told me "never update the code the day you present it"
</commit_message>
<xml_diff>
--- a/dbops-pshsummit.pptx
+++ b/dbops-pshsummit.pptx
@@ -16,6 +16,7 @@
     <p:sldId id="264" r:id="rId10"/>
     <p:sldId id="263" r:id="rId11"/>
     <p:sldId id="266" r:id="rId12"/>
+    <p:sldId id="271" r:id="rId13"/>
   </p:sldIdLst>
   <p:sldSz cx="12192000" cy="6858000"/>
   <p:notesSz cx="6858000" cy="9144000"/>
@@ -3848,7 +3849,7 @@
           <a:p>
             <a:fld id="{31328348-CD76-47F5-8BC2-B1A985D2B59A}" type="datetimeFigureOut">
               <a:rPr lang="en-US" smtClean="0"/>
-              <a:t>4/28/2019</a:t>
+              <a:t>4/30/2019</a:t>
             </a:fld>
             <a:endParaRPr lang="en-US"/>
           </a:p>
@@ -4146,7 +4147,7 @@
           <a:p>
             <a:fld id="{31328348-CD76-47F5-8BC2-B1A985D2B59A}" type="datetimeFigureOut">
               <a:rPr lang="en-US" smtClean="0"/>
-              <a:t>4/28/2019</a:t>
+              <a:t>4/30/2019</a:t>
             </a:fld>
             <a:endParaRPr lang="en-US"/>
           </a:p>
@@ -4338,7 +4339,7 @@
           <a:p>
             <a:fld id="{31328348-CD76-47F5-8BC2-B1A985D2B59A}" type="datetimeFigureOut">
               <a:rPr lang="en-US" smtClean="0"/>
-              <a:t>4/28/2019</a:t>
+              <a:t>4/30/2019</a:t>
             </a:fld>
             <a:endParaRPr lang="en-US"/>
           </a:p>
@@ -4599,7 +4600,7 @@
           <a:p>
             <a:fld id="{31328348-CD76-47F5-8BC2-B1A985D2B59A}" type="datetimeFigureOut">
               <a:rPr lang="en-US" smtClean="0"/>
-              <a:t>4/28/2019</a:t>
+              <a:t>4/30/2019</a:t>
             </a:fld>
             <a:endParaRPr lang="en-US"/>
           </a:p>
@@ -5023,7 +5024,7 @@
           <a:p>
             <a:fld id="{31328348-CD76-47F5-8BC2-B1A985D2B59A}" type="datetimeFigureOut">
               <a:rPr lang="en-US" smtClean="0"/>
-              <a:t>4/28/2019</a:t>
+              <a:t>4/30/2019</a:t>
             </a:fld>
             <a:endParaRPr lang="en-US"/>
           </a:p>
@@ -5560,7 +5561,7 @@
           <a:p>
             <a:fld id="{31328348-CD76-47F5-8BC2-B1A985D2B59A}" type="datetimeFigureOut">
               <a:rPr lang="en-US" smtClean="0"/>
-              <a:t>4/28/2019</a:t>
+              <a:t>4/30/2019</a:t>
             </a:fld>
             <a:endParaRPr lang="en-US"/>
           </a:p>
@@ -6424,7 +6425,7 @@
           <a:p>
             <a:fld id="{31328348-CD76-47F5-8BC2-B1A985D2B59A}" type="datetimeFigureOut">
               <a:rPr lang="en-US" smtClean="0"/>
-              <a:t>4/28/2019</a:t>
+              <a:t>4/30/2019</a:t>
             </a:fld>
             <a:endParaRPr lang="en-US"/>
           </a:p>
@@ -6594,7 +6595,7 @@
           <a:p>
             <a:fld id="{31328348-CD76-47F5-8BC2-B1A985D2B59A}" type="datetimeFigureOut">
               <a:rPr lang="en-US" smtClean="0"/>
-              <a:t>4/28/2019</a:t>
+              <a:t>4/30/2019</a:t>
             </a:fld>
             <a:endParaRPr lang="en-US"/>
           </a:p>
@@ -6778,7 +6779,7 @@
           <a:p>
             <a:fld id="{31328348-CD76-47F5-8BC2-B1A985D2B59A}" type="datetimeFigureOut">
               <a:rPr lang="en-US" smtClean="0"/>
-              <a:t>4/28/2019</a:t>
+              <a:t>4/30/2019</a:t>
             </a:fld>
             <a:endParaRPr lang="en-US"/>
           </a:p>
@@ -6948,7 +6949,7 @@
           <a:p>
             <a:fld id="{31328348-CD76-47F5-8BC2-B1A985D2B59A}" type="datetimeFigureOut">
               <a:rPr lang="en-US" smtClean="0"/>
-              <a:t>4/28/2019</a:t>
+              <a:t>4/30/2019</a:t>
             </a:fld>
             <a:endParaRPr lang="en-US"/>
           </a:p>
@@ -7192,7 +7193,7 @@
           <a:p>
             <a:fld id="{31328348-CD76-47F5-8BC2-B1A985D2B59A}" type="datetimeFigureOut">
               <a:rPr lang="en-US" smtClean="0"/>
-              <a:t>4/28/2019</a:t>
+              <a:t>4/30/2019</a:t>
             </a:fld>
             <a:endParaRPr lang="en-US"/>
           </a:p>
@@ -7428,7 +7429,7 @@
           <a:p>
             <a:fld id="{31328348-CD76-47F5-8BC2-B1A985D2B59A}" type="datetimeFigureOut">
               <a:rPr lang="en-US" smtClean="0"/>
-              <a:t>4/28/2019</a:t>
+              <a:t>4/30/2019</a:t>
             </a:fld>
             <a:endParaRPr lang="en-US"/>
           </a:p>
@@ -7894,7 +7895,7 @@
           <a:p>
             <a:fld id="{31328348-CD76-47F5-8BC2-B1A985D2B59A}" type="datetimeFigureOut">
               <a:rPr lang="en-US" smtClean="0"/>
-              <a:t>4/28/2019</a:t>
+              <a:t>4/30/2019</a:t>
             </a:fld>
             <a:endParaRPr lang="en-US"/>
           </a:p>
@@ -8012,7 +8013,7 @@
           <a:p>
             <a:fld id="{31328348-CD76-47F5-8BC2-B1A985D2B59A}" type="datetimeFigureOut">
               <a:rPr lang="en-US" smtClean="0"/>
-              <a:t>4/28/2019</a:t>
+              <a:t>4/30/2019</a:t>
             </a:fld>
             <a:endParaRPr lang="en-US"/>
           </a:p>
@@ -8107,7 +8108,7 @@
           <a:p>
             <a:fld id="{31328348-CD76-47F5-8BC2-B1A985D2B59A}" type="datetimeFigureOut">
               <a:rPr lang="en-US" smtClean="0"/>
-              <a:t>4/28/2019</a:t>
+              <a:t>4/30/2019</a:t>
             </a:fld>
             <a:endParaRPr lang="en-US"/>
           </a:p>
@@ -8362,7 +8363,7 @@
           <a:p>
             <a:fld id="{31328348-CD76-47F5-8BC2-B1A985D2B59A}" type="datetimeFigureOut">
               <a:rPr lang="en-US" smtClean="0"/>
-              <a:t>4/28/2019</a:t>
+              <a:t>4/30/2019</a:t>
             </a:fld>
             <a:endParaRPr lang="en-US"/>
           </a:p>
@@ -8662,7 +8663,7 @@
           <a:p>
             <a:fld id="{31328348-CD76-47F5-8BC2-B1A985D2B59A}" type="datetimeFigureOut">
               <a:rPr lang="en-US" smtClean="0"/>
-              <a:t>4/28/2019</a:t>
+              <a:t>4/30/2019</a:t>
             </a:fld>
             <a:endParaRPr lang="en-US"/>
           </a:p>
@@ -8896,7 +8897,7 @@
           <a:p>
             <a:fld id="{31328348-CD76-47F5-8BC2-B1A985D2B59A}" type="datetimeFigureOut">
               <a:rPr lang="en-US" smtClean="0"/>
-              <a:t>4/28/2019</a:t>
+              <a:t>4/30/2019</a:t>
             </a:fld>
             <a:endParaRPr lang="en-US"/>
           </a:p>
@@ -12263,6 +12264,66 @@
 </p:sld>
 </file>
 
+<file path=ppt/slides/slide12.xml><?xml version="1.0" encoding="utf-8"?>
+<p:sld xmlns:a="http://schemas.openxmlformats.org/drawingml/2006/main" xmlns:r="http://schemas.openxmlformats.org/officeDocument/2006/relationships" xmlns:p="http://schemas.openxmlformats.org/presentationml/2006/main">
+  <p:cSld>
+    <p:spTree>
+      <p:nvGrpSpPr>
+        <p:cNvPr id="1" name=""/>
+        <p:cNvGrpSpPr/>
+        <p:nvPr/>
+      </p:nvGrpSpPr>
+      <p:grpSpPr>
+        <a:xfrm>
+          <a:off x="0" y="0"/>
+          <a:ext cx="0" cy="0"/>
+          <a:chOff x="0" y="0"/>
+          <a:chExt cx="0" cy="0"/>
+        </a:xfrm>
+      </p:grpSpPr>
+      <p:sp>
+        <p:nvSpPr>
+          <p:cNvPr id="2" name="Title 1"/>
+          <p:cNvSpPr>
+            <a:spLocks noGrp="1"/>
+          </p:cNvSpPr>
+          <p:nvPr>
+            <p:ph type="title"/>
+          </p:nvPr>
+        </p:nvSpPr>
+        <p:spPr>
+          <a:xfrm>
+            <a:off x="770021" y="2789208"/>
+            <a:ext cx="10353762" cy="970450"/>
+          </a:xfrm>
+        </p:spPr>
+        <p:txBody>
+          <a:bodyPr>
+            <a:noAutofit/>
+          </a:bodyPr>
+          <a:lstStyle/>
+          <a:p>
+            <a:r>
+              <a:rPr lang="en-US" sz="13800" dirty="0" smtClean="0"/>
+              <a:t>Q&amp;A</a:t>
+            </a:r>
+            <a:endParaRPr lang="en-US" sz="13800" dirty="0"/>
+          </a:p>
+        </p:txBody>
+      </p:sp>
+    </p:spTree>
+    <p:extLst>
+      <p:ext uri="{BB962C8B-B14F-4D97-AF65-F5344CB8AC3E}">
+        <p14:creationId xmlns:p14="http://schemas.microsoft.com/office/powerpoint/2010/main" val="1111617713"/>
+      </p:ext>
+    </p:extLst>
+  </p:cSld>
+  <p:clrMapOvr>
+    <a:masterClrMapping/>
+  </p:clrMapOvr>
+</p:sld>
+</file>
+
 <file path=ppt/slides/slide2.xml><?xml version="1.0" encoding="utf-8"?>
 <p:sld xmlns:a="http://schemas.openxmlformats.org/drawingml/2006/main" xmlns:r="http://schemas.openxmlformats.org/officeDocument/2006/relationships" xmlns:p="http://schemas.openxmlformats.org/presentationml/2006/main">
   <p:cSld>
@@ -12445,11 +12506,11 @@
   <p:clrMapOvr>
     <a:masterClrMapping/>
   </p:clrMapOvr>
-  <mc:AlternateContent xmlns:mc="http://schemas.openxmlformats.org/markup-compatibility/2006">
-    <mc:Choice xmlns:p14="http://schemas.microsoft.com/office/powerpoint/2010/main" Requires="p14">
+  <mc:AlternateContent xmlns:mc="http://schemas.openxmlformats.org/markup-compatibility/2006" xmlns:p14="http://schemas.microsoft.com/office/powerpoint/2010/main">
+    <mc:Choice Requires="p14">
       <p:transition spd="slow" p14:dur="2000"/>
     </mc:Choice>
-    <mc:Fallback>
+    <mc:Fallback xmlns="">
       <p:transition spd="slow"/>
     </mc:Fallback>
   </mc:AlternateContent>

</xml_diff>